<commit_message>
added examples from slides
</commit_message>
<xml_diff>
--- a/lectures/4.2StackHeapRefsHigherOrderFctsTracing/lecture.pptx
+++ b/lectures/4.2StackHeapRefsHigherOrderFctsTracing/lecture.pptx
@@ -5380,7 +5380,7 @@
 </file>
 
 <file path=ppt/slides/slide12.xml><?xml version="1.0" encoding="utf-8"?>
-<p:sld xmlns:a="http://schemas.openxmlformats.org/drawingml/2006/main" xmlns:r="http://schemas.openxmlformats.org/officeDocument/2006/relationships" xmlns:p="http://schemas.openxmlformats.org/presentationml/2006/main" show="0">
+<p:sld xmlns:a="http://schemas.openxmlformats.org/drawingml/2006/main" xmlns:r="http://schemas.openxmlformats.org/officeDocument/2006/relationships" xmlns:p="http://schemas.openxmlformats.org/presentationml/2006/main">
   <p:cSld>
     <p:spTree>
       <p:nvGrpSpPr>
@@ -5912,7 +5912,7 @@
 </file>
 
 <file path=ppt/slides/slide13.xml><?xml version="1.0" encoding="utf-8"?>
-<p:sld xmlns:a="http://schemas.openxmlformats.org/drawingml/2006/main" xmlns:r="http://schemas.openxmlformats.org/officeDocument/2006/relationships" xmlns:p="http://schemas.openxmlformats.org/presentationml/2006/main" show="0">
+<p:sld xmlns:a="http://schemas.openxmlformats.org/drawingml/2006/main" xmlns:r="http://schemas.openxmlformats.org/officeDocument/2006/relationships" xmlns:p="http://schemas.openxmlformats.org/presentationml/2006/main">
   <p:cSld>
     <p:spTree>
       <p:nvGrpSpPr>
@@ -6500,7 +6500,7 @@
 </file>
 
 <file path=ppt/slides/slide14.xml><?xml version="1.0" encoding="utf-8"?>
-<p:sld xmlns:a="http://schemas.openxmlformats.org/drawingml/2006/main" xmlns:r="http://schemas.openxmlformats.org/officeDocument/2006/relationships" xmlns:p="http://schemas.openxmlformats.org/presentationml/2006/main" show="0">
+<p:sld xmlns:a="http://schemas.openxmlformats.org/drawingml/2006/main" xmlns:r="http://schemas.openxmlformats.org/officeDocument/2006/relationships" xmlns:p="http://schemas.openxmlformats.org/presentationml/2006/main">
   <p:cSld>
     <p:spTree>
       <p:nvGrpSpPr>
@@ -6539,7 +6539,7 @@
           <a:p>
             <a:r>
               <a:rPr lang="en-GB" dirty="0" err="1"/>
-              <a:t>Til</a:t>
+              <a:t>Hvad</a:t>
             </a:r>
             <a:r>
               <a:rPr lang="en-GB" dirty="0"/>
@@ -6547,241 +6547,11 @@
             </a:r>
             <a:r>
               <a:rPr lang="en-GB" dirty="0" err="1"/>
-              <a:t>tavlen</a:t>
-            </a:r>
-            <a:endParaRPr lang="en-GB" dirty="0"/>
-          </a:p>
-        </p:txBody>
-      </p:sp>
-      <p:sp>
-        <p:nvSpPr>
-          <p:cNvPr id="4" name="Rectangle 3">
-            <a:extLst>
-              <a:ext uri="{FF2B5EF4-FFF2-40B4-BE49-F238E27FC236}">
-                <a16:creationId xmlns:a16="http://schemas.microsoft.com/office/drawing/2014/main" id="{08C091B1-5A94-7E47-9CA2-8C686D691248}"/>
-              </a:ext>
-            </a:extLst>
-          </p:cNvPr>
-          <p:cNvSpPr/>
-          <p:nvPr/>
-        </p:nvSpPr>
-        <p:spPr>
-          <a:xfrm>
-            <a:off x="1267407" y="2095505"/>
-            <a:ext cx="4151758" cy="1815882"/>
-          </a:xfrm>
-          <a:prstGeom prst="rect">
-            <a:avLst/>
-          </a:prstGeom>
-        </p:spPr>
-        <p:txBody>
-          <a:bodyPr wrap="square">
-            <a:spAutoFit/>
-          </a:bodyPr>
-          <a:lstStyle/>
-          <a:p>
-            <a:r>
-              <a:rPr lang="en-GB" sz="1400" dirty="0">
-                <a:latin typeface="Lucida Sans Typewriter" panose="020B0509030504030204" pitchFamily="49" charset="77"/>
-                <a:ea typeface="DejaVu Sans Book" panose="020B0603030804020204" pitchFamily="34" charset="0"/>
-                <a:cs typeface="DejaVu Sans Book" panose="020B0603030804020204" pitchFamily="34" charset="0"/>
-              </a:rPr>
-              <a:t>let </a:t>
-            </a:r>
-            <a:r>
-              <a:rPr lang="en-GB" sz="1400" dirty="0" err="1">
-                <a:latin typeface="Lucida Sans Typewriter" panose="020B0509030504030204" pitchFamily="49" charset="77"/>
-                <a:ea typeface="DejaVu Sans Book" panose="020B0603030804020204" pitchFamily="34" charset="0"/>
-                <a:cs typeface="DejaVu Sans Book" panose="020B0603030804020204" pitchFamily="34" charset="0"/>
-              </a:rPr>
-              <a:t>mul</a:t>
-            </a:r>
-            <a:r>
-              <a:rPr lang="en-GB" sz="1400" dirty="0">
-                <a:latin typeface="Lucida Sans Typewriter" panose="020B0509030504030204" pitchFamily="49" charset="77"/>
-                <a:ea typeface="DejaVu Sans Book" panose="020B0603030804020204" pitchFamily="34" charset="0"/>
-                <a:cs typeface="DejaVu Sans Book" panose="020B0603030804020204" pitchFamily="34" charset="0"/>
-              </a:rPr>
-              <a:t> x y = x * y</a:t>
-            </a:r>
-          </a:p>
-          <a:p>
-            <a:r>
-              <a:rPr lang="en-GB" sz="1400" dirty="0">
-                <a:latin typeface="Lucida Sans Typewriter" panose="020B0509030504030204" pitchFamily="49" charset="77"/>
-                <a:ea typeface="DejaVu Sans Book" panose="020B0603030804020204" pitchFamily="34" charset="0"/>
-                <a:cs typeface="DejaVu Sans Book" panose="020B0603030804020204" pitchFamily="34" charset="0"/>
-              </a:rPr>
-              <a:t>let factor = 2.0</a:t>
-            </a:r>
-          </a:p>
-          <a:p>
-            <a:r>
-              <a:rPr lang="en-GB" sz="1400" dirty="0">
-                <a:latin typeface="Lucida Sans Typewriter" panose="020B0509030504030204" pitchFamily="49" charset="77"/>
-                <a:ea typeface="DejaVu Sans Book" panose="020B0603030804020204" pitchFamily="34" charset="0"/>
-                <a:cs typeface="DejaVu Sans Book" panose="020B0603030804020204" pitchFamily="34" charset="0"/>
-              </a:rPr>
-              <a:t>let </a:t>
-            </a:r>
-            <a:r>
-              <a:rPr lang="en-GB" sz="1400" dirty="0" err="1">
-                <a:latin typeface="Lucida Sans Typewriter" panose="020B0509030504030204" pitchFamily="49" charset="77"/>
-                <a:ea typeface="DejaVu Sans Book" panose="020B0603030804020204" pitchFamily="34" charset="0"/>
-                <a:cs typeface="DejaVu Sans Book" panose="020B0603030804020204" pitchFamily="34" charset="0"/>
-              </a:rPr>
-              <a:t>applyFactor</a:t>
-            </a:r>
-            <a:r>
-              <a:rPr lang="en-GB" sz="1400" dirty="0">
-                <a:latin typeface="Lucida Sans Typewriter" panose="020B0509030504030204" pitchFamily="49" charset="77"/>
-                <a:ea typeface="DejaVu Sans Book" panose="020B0603030804020204" pitchFamily="34" charset="0"/>
-                <a:cs typeface="DejaVu Sans Book" panose="020B0603030804020204" pitchFamily="34" charset="0"/>
-              </a:rPr>
-              <a:t> </a:t>
-            </a:r>
-            <a:r>
-              <a:rPr lang="en-GB" sz="1400" dirty="0" err="1">
-                <a:latin typeface="Lucida Sans Typewriter" panose="020B0509030504030204" pitchFamily="49" charset="77"/>
-                <a:ea typeface="DejaVu Sans Book" panose="020B0603030804020204" pitchFamily="34" charset="0"/>
-                <a:cs typeface="DejaVu Sans Book" panose="020B0603030804020204" pitchFamily="34" charset="0"/>
-              </a:rPr>
-              <a:t>fct</a:t>
-            </a:r>
-            <a:r>
-              <a:rPr lang="en-GB" sz="1400" dirty="0">
-                <a:latin typeface="Lucida Sans Typewriter" panose="020B0509030504030204" pitchFamily="49" charset="77"/>
-                <a:ea typeface="DejaVu Sans Book" panose="020B0603030804020204" pitchFamily="34" charset="0"/>
-                <a:cs typeface="DejaVu Sans Book" panose="020B0603030804020204" pitchFamily="34" charset="0"/>
-              </a:rPr>
-              <a:t> x = </a:t>
-            </a:r>
-          </a:p>
-          <a:p>
-            <a:r>
-              <a:rPr lang="en-GB" sz="1400" dirty="0">
-                <a:latin typeface="Lucida Sans Typewriter" panose="020B0509030504030204" pitchFamily="49" charset="77"/>
-                <a:ea typeface="DejaVu Sans Book" panose="020B0603030804020204" pitchFamily="34" charset="0"/>
-                <a:cs typeface="DejaVu Sans Book" panose="020B0603030804020204" pitchFamily="34" charset="0"/>
-              </a:rPr>
-              <a:t>  let a = </a:t>
-            </a:r>
-            <a:r>
-              <a:rPr lang="en-GB" sz="1400" dirty="0" err="1">
-                <a:latin typeface="Lucida Sans Typewriter" panose="020B0509030504030204" pitchFamily="49" charset="77"/>
-                <a:ea typeface="DejaVu Sans Book" panose="020B0603030804020204" pitchFamily="34" charset="0"/>
-                <a:cs typeface="DejaVu Sans Book" panose="020B0603030804020204" pitchFamily="34" charset="0"/>
-              </a:rPr>
-              <a:t>fct</a:t>
-            </a:r>
-            <a:r>
-              <a:rPr lang="en-GB" sz="1400" dirty="0">
-                <a:latin typeface="Lucida Sans Typewriter" panose="020B0509030504030204" pitchFamily="49" charset="77"/>
-                <a:ea typeface="DejaVu Sans Book" panose="020B0603030804020204" pitchFamily="34" charset="0"/>
-                <a:cs typeface="DejaVu Sans Book" panose="020B0603030804020204" pitchFamily="34" charset="0"/>
-              </a:rPr>
-              <a:t> factor x</a:t>
-            </a:r>
-          </a:p>
-          <a:p>
-            <a:r>
-              <a:rPr lang="en-GB" sz="1400" dirty="0">
-                <a:latin typeface="Lucida Sans Typewriter" panose="020B0509030504030204" pitchFamily="49" charset="77"/>
-                <a:ea typeface="DejaVu Sans Book" panose="020B0603030804020204" pitchFamily="34" charset="0"/>
-                <a:cs typeface="DejaVu Sans Book" panose="020B0603030804020204" pitchFamily="34" charset="0"/>
-              </a:rPr>
-              <a:t>  string a</a:t>
-            </a:r>
-          </a:p>
-          <a:p>
-            <a:endParaRPr lang="en-GB" sz="1400" dirty="0">
-              <a:latin typeface="Lucida Sans Typewriter" panose="020B0509030504030204" pitchFamily="49" charset="77"/>
-              <a:ea typeface="DejaVu Sans Book" panose="020B0603030804020204" pitchFamily="34" charset="0"/>
-              <a:cs typeface="DejaVu Sans Book" panose="020B0603030804020204" pitchFamily="34" charset="0"/>
-            </a:endParaRPr>
-          </a:p>
-          <a:p>
-            <a:r>
-              <a:rPr lang="en-GB" sz="1400" dirty="0" err="1">
-                <a:latin typeface="Lucida Sans Typewriter" panose="020B0509030504030204" pitchFamily="49" charset="77"/>
-                <a:ea typeface="DejaVu Sans Book" panose="020B0603030804020204" pitchFamily="34" charset="0"/>
-                <a:cs typeface="DejaVu Sans Book" panose="020B0603030804020204" pitchFamily="34" charset="0"/>
-              </a:rPr>
-              <a:t>printfn</a:t>
-            </a:r>
-            <a:r>
-              <a:rPr lang="en-GB" sz="1400" dirty="0">
-                <a:latin typeface="Lucida Sans Typewriter" panose="020B0509030504030204" pitchFamily="49" charset="77"/>
-                <a:ea typeface="DejaVu Sans Book" panose="020B0603030804020204" pitchFamily="34" charset="0"/>
-                <a:cs typeface="DejaVu Sans Book" panose="020B0603030804020204" pitchFamily="34" charset="0"/>
-              </a:rPr>
-              <a:t> "%g" (</a:t>
-            </a:r>
-            <a:r>
-              <a:rPr lang="en-GB" sz="1400" dirty="0" err="1">
-                <a:latin typeface="Lucida Sans Typewriter" panose="020B0509030504030204" pitchFamily="49" charset="77"/>
-                <a:ea typeface="DejaVu Sans Book" panose="020B0603030804020204" pitchFamily="34" charset="0"/>
-                <a:cs typeface="DejaVu Sans Book" panose="020B0603030804020204" pitchFamily="34" charset="0"/>
-              </a:rPr>
-              <a:t>mul</a:t>
-            </a:r>
-            <a:r>
-              <a:rPr lang="en-GB" sz="1400" dirty="0">
-                <a:latin typeface="Lucida Sans Typewriter" panose="020B0509030504030204" pitchFamily="49" charset="77"/>
-                <a:ea typeface="DejaVu Sans Book" panose="020B0603030804020204" pitchFamily="34" charset="0"/>
-                <a:cs typeface="DejaVu Sans Book" panose="020B0603030804020204" pitchFamily="34" charset="0"/>
-              </a:rPr>
-              <a:t> 5.0 3.0)</a:t>
-            </a:r>
-          </a:p>
-          <a:p>
-            <a:r>
-              <a:rPr lang="en-GB" sz="1400" dirty="0" err="1">
-                <a:latin typeface="Lucida Sans Typewriter" panose="020B0509030504030204" pitchFamily="49" charset="77"/>
-                <a:ea typeface="DejaVu Sans Book" panose="020B0603030804020204" pitchFamily="34" charset="0"/>
-                <a:cs typeface="DejaVu Sans Book" panose="020B0603030804020204" pitchFamily="34" charset="0"/>
-              </a:rPr>
-              <a:t>printfn</a:t>
-            </a:r>
-            <a:r>
-              <a:rPr lang="en-GB" sz="1400" dirty="0">
-                <a:latin typeface="Lucida Sans Typewriter" panose="020B0509030504030204" pitchFamily="49" charset="77"/>
-                <a:ea typeface="DejaVu Sans Book" panose="020B0603030804020204" pitchFamily="34" charset="0"/>
-                <a:cs typeface="DejaVu Sans Book" panose="020B0603030804020204" pitchFamily="34" charset="0"/>
-              </a:rPr>
-              <a:t> "%s" (</a:t>
-            </a:r>
-            <a:r>
-              <a:rPr lang="en-GB" sz="1400" dirty="0" err="1">
-                <a:latin typeface="Lucida Sans Typewriter" panose="020B0509030504030204" pitchFamily="49" charset="77"/>
-                <a:ea typeface="DejaVu Sans Book" panose="020B0603030804020204" pitchFamily="34" charset="0"/>
-                <a:cs typeface="DejaVu Sans Book" panose="020B0603030804020204" pitchFamily="34" charset="0"/>
-              </a:rPr>
-              <a:t>applyFactor</a:t>
-            </a:r>
-            <a:r>
-              <a:rPr lang="en-GB" sz="1400" dirty="0">
-                <a:latin typeface="Lucida Sans Typewriter" panose="020B0509030504030204" pitchFamily="49" charset="77"/>
-                <a:ea typeface="DejaVu Sans Book" panose="020B0603030804020204" pitchFamily="34" charset="0"/>
-                <a:cs typeface="DejaVu Sans Book" panose="020B0603030804020204" pitchFamily="34" charset="0"/>
-              </a:rPr>
-              <a:t> </a:t>
-            </a:r>
-            <a:r>
-              <a:rPr lang="en-GB" sz="1400" dirty="0" err="1">
-                <a:latin typeface="Lucida Sans Typewriter" panose="020B0509030504030204" pitchFamily="49" charset="77"/>
-                <a:ea typeface="DejaVu Sans Book" panose="020B0603030804020204" pitchFamily="34" charset="0"/>
-                <a:cs typeface="DejaVu Sans Book" panose="020B0603030804020204" pitchFamily="34" charset="0"/>
-              </a:rPr>
-              <a:t>mul</a:t>
-            </a:r>
-            <a:r>
-              <a:rPr lang="en-GB" sz="1400" dirty="0">
-                <a:latin typeface="Lucida Sans Typewriter" panose="020B0509030504030204" pitchFamily="49" charset="77"/>
-                <a:ea typeface="DejaVu Sans Book" panose="020B0603030804020204" pitchFamily="34" charset="0"/>
-                <a:cs typeface="DejaVu Sans Book" panose="020B0603030804020204" pitchFamily="34" charset="0"/>
-              </a:rPr>
-              <a:t> 3.0)</a:t>
+              <a:t>sker</a:t>
+            </a:r>
+            <a:r>
+              <a:rPr lang="en-GB" dirty="0"/>
+              <a:t> der?</a:t>
             </a:r>
           </a:p>
         </p:txBody>
@@ -6800,8 +6570,8 @@
         </p:nvSpPr>
         <p:spPr>
           <a:xfrm>
-            <a:off x="6607629" y="2095505"/>
-            <a:ext cx="4151758" cy="2031325"/>
+            <a:off x="3786856" y="1790725"/>
+            <a:ext cx="4151758" cy="2585323"/>
           </a:xfrm>
           <a:prstGeom prst="rect">
             <a:avLst/>
@@ -6814,7 +6584,7 @@
           <a:lstStyle/>
           <a:p>
             <a:r>
-              <a:rPr lang="en-GB" sz="1400" dirty="0">
+              <a:rPr lang="en-GB" dirty="0">
                 <a:latin typeface="Lucida Sans Typewriter" panose="020B0509030504030204" pitchFamily="49" charset="77"/>
                 <a:ea typeface="DejaVu Sans Book" panose="020B0603030804020204" pitchFamily="34" charset="0"/>
                 <a:cs typeface="DejaVu Sans Book" panose="020B0603030804020204" pitchFamily="34" charset="0"/>
@@ -6822,7 +6592,7 @@
               <a:t>let </a:t>
             </a:r>
             <a:r>
-              <a:rPr lang="en-GB" sz="1400" dirty="0" err="1">
+              <a:rPr lang="en-GB" dirty="0" err="1">
                 <a:latin typeface="Lucida Sans Typewriter" panose="020B0509030504030204" pitchFamily="49" charset="77"/>
                 <a:ea typeface="DejaVu Sans Book" panose="020B0603030804020204" pitchFamily="34" charset="0"/>
                 <a:cs typeface="DejaVu Sans Book" panose="020B0603030804020204" pitchFamily="34" charset="0"/>
@@ -6830,7 +6600,7 @@
               <a:t>incr</a:t>
             </a:r>
             <a:r>
-              <a:rPr lang="en-GB" sz="1400" dirty="0">
+              <a:rPr lang="en-GB" dirty="0">
                 <a:latin typeface="Lucida Sans Typewriter" panose="020B0509030504030204" pitchFamily="49" charset="77"/>
                 <a:ea typeface="DejaVu Sans Book" panose="020B0603030804020204" pitchFamily="34" charset="0"/>
                 <a:cs typeface="DejaVu Sans Book" panose="020B0603030804020204" pitchFamily="34" charset="0"/>
@@ -6840,7 +6610,7 @@
           </a:p>
           <a:p>
             <a:r>
-              <a:rPr lang="en-GB" sz="1400" dirty="0">
+              <a:rPr lang="en-GB" dirty="0">
                 <a:latin typeface="Lucida Sans Typewriter" panose="020B0509030504030204" pitchFamily="49" charset="77"/>
                 <a:ea typeface="DejaVu Sans Book" panose="020B0603030804020204" pitchFamily="34" charset="0"/>
                 <a:cs typeface="DejaVu Sans Book" panose="020B0603030804020204" pitchFamily="34" charset="0"/>
@@ -6850,7 +6620,7 @@
           </a:p>
           <a:p>
             <a:r>
-              <a:rPr lang="en-GB" sz="1400" dirty="0">
+              <a:rPr lang="en-GB" dirty="0">
                 <a:latin typeface="Lucida Sans Typewriter" panose="020B0509030504030204" pitchFamily="49" charset="77"/>
                 <a:ea typeface="DejaVu Sans Book" panose="020B0603030804020204" pitchFamily="34" charset="0"/>
                 <a:cs typeface="DejaVu Sans Book" panose="020B0603030804020204" pitchFamily="34" charset="0"/>
@@ -6860,7 +6630,7 @@
           </a:p>
           <a:p>
             <a:r>
-              <a:rPr lang="en-GB" sz="1400" dirty="0">
+              <a:rPr lang="en-GB" dirty="0">
                 <a:latin typeface="Lucida Sans Typewriter" panose="020B0509030504030204" pitchFamily="49" charset="77"/>
                 <a:ea typeface="DejaVu Sans Book" panose="020B0603030804020204" pitchFamily="34" charset="0"/>
                 <a:cs typeface="DejaVu Sans Book" panose="020B0603030804020204" pitchFamily="34" charset="0"/>
@@ -6870,7 +6640,7 @@
           </a:p>
           <a:p>
             <a:r>
-              <a:rPr lang="en-GB" sz="1400" dirty="0">
+              <a:rPr lang="en-GB" dirty="0">
                 <a:latin typeface="Lucida Sans Typewriter" panose="020B0509030504030204" pitchFamily="49" charset="77"/>
                 <a:ea typeface="DejaVu Sans Book" panose="020B0603030804020204" pitchFamily="34" charset="0"/>
                 <a:cs typeface="DejaVu Sans Book" panose="020B0603030804020204" pitchFamily="34" charset="0"/>
@@ -6879,7 +6649,7 @@
             </a:r>
           </a:p>
           <a:p>
-            <a:endParaRPr lang="en-GB" sz="1400" dirty="0">
+            <a:endParaRPr lang="en-GB" dirty="0">
               <a:latin typeface="Lucida Sans Typewriter" panose="020B0509030504030204" pitchFamily="49" charset="77"/>
               <a:ea typeface="DejaVu Sans Book" panose="020B0603030804020204" pitchFamily="34" charset="0"/>
               <a:cs typeface="DejaVu Sans Book" panose="020B0603030804020204" pitchFamily="34" charset="0"/>
@@ -6887,7 +6657,7 @@
           </a:p>
           <a:p>
             <a:r>
-              <a:rPr lang="en-GB" sz="1400" dirty="0" err="1">
+              <a:rPr lang="en-GB" dirty="0" err="1">
                 <a:latin typeface="Lucida Sans Typewriter" panose="020B0509030504030204" pitchFamily="49" charset="77"/>
                 <a:ea typeface="DejaVu Sans Book" panose="020B0603030804020204" pitchFamily="34" charset="0"/>
                 <a:cs typeface="DejaVu Sans Book" panose="020B0603030804020204" pitchFamily="34" charset="0"/>
@@ -6895,7 +6665,7 @@
               <a:t>printfn</a:t>
             </a:r>
             <a:r>
-              <a:rPr lang="en-GB" sz="1400" dirty="0">
+              <a:rPr lang="en-GB" dirty="0">
                 <a:latin typeface="Lucida Sans Typewriter" panose="020B0509030504030204" pitchFamily="49" charset="77"/>
                 <a:ea typeface="DejaVu Sans Book" panose="020B0603030804020204" pitchFamily="34" charset="0"/>
                 <a:cs typeface="DejaVu Sans Book" panose="020B0603030804020204" pitchFamily="34" charset="0"/>
@@ -6903,7 +6673,7 @@
               <a:t> "%d" (</a:t>
             </a:r>
             <a:r>
-              <a:rPr lang="en-GB" sz="1400" dirty="0" err="1">
+              <a:rPr lang="en-GB" dirty="0" err="1">
                 <a:latin typeface="Lucida Sans Typewriter" panose="020B0509030504030204" pitchFamily="49" charset="77"/>
                 <a:ea typeface="DejaVu Sans Book" panose="020B0603030804020204" pitchFamily="34" charset="0"/>
                 <a:cs typeface="DejaVu Sans Book" panose="020B0603030804020204" pitchFamily="34" charset="0"/>
@@ -6911,7 +6681,7 @@
               <a:t>incr</a:t>
             </a:r>
             <a:r>
-              <a:rPr lang="en-GB" sz="1400" dirty="0">
+              <a:rPr lang="en-GB" dirty="0">
                 <a:latin typeface="Lucida Sans Typewriter" panose="020B0509030504030204" pitchFamily="49" charset="77"/>
                 <a:ea typeface="DejaVu Sans Book" panose="020B0603030804020204" pitchFamily="34" charset="0"/>
                 <a:cs typeface="DejaVu Sans Book" panose="020B0603030804020204" pitchFamily="34" charset="0"/>
@@ -6921,7 +6691,7 @@
           </a:p>
           <a:p>
             <a:r>
-              <a:rPr lang="en-GB" sz="1400" dirty="0" err="1">
+              <a:rPr lang="en-GB" dirty="0" err="1">
                 <a:latin typeface="Lucida Sans Typewriter" panose="020B0509030504030204" pitchFamily="49" charset="77"/>
                 <a:ea typeface="DejaVu Sans Book" panose="020B0603030804020204" pitchFamily="34" charset="0"/>
                 <a:cs typeface="DejaVu Sans Book" panose="020B0603030804020204" pitchFamily="34" charset="0"/>
@@ -6929,7 +6699,7 @@
               <a:t>printfn</a:t>
             </a:r>
             <a:r>
-              <a:rPr lang="en-GB" sz="1400" dirty="0">
+              <a:rPr lang="en-GB" dirty="0">
                 <a:latin typeface="Lucida Sans Typewriter" panose="020B0509030504030204" pitchFamily="49" charset="77"/>
                 <a:ea typeface="DejaVu Sans Book" panose="020B0603030804020204" pitchFamily="34" charset="0"/>
                 <a:cs typeface="DejaVu Sans Book" panose="020B0603030804020204" pitchFamily="34" charset="0"/>
@@ -6937,7 +6707,7 @@
               <a:t> "%d" (</a:t>
             </a:r>
             <a:r>
-              <a:rPr lang="en-GB" sz="1400" dirty="0" err="1">
+              <a:rPr lang="en-GB" dirty="0" err="1">
                 <a:latin typeface="Lucida Sans Typewriter" panose="020B0509030504030204" pitchFamily="49" charset="77"/>
                 <a:ea typeface="DejaVu Sans Book" panose="020B0603030804020204" pitchFamily="34" charset="0"/>
                 <a:cs typeface="DejaVu Sans Book" panose="020B0603030804020204" pitchFamily="34" charset="0"/>
@@ -6945,7 +6715,7 @@
               <a:t>incr</a:t>
             </a:r>
             <a:r>
-              <a:rPr lang="en-GB" sz="1400" dirty="0">
+              <a:rPr lang="en-GB" dirty="0">
                 <a:latin typeface="Lucida Sans Typewriter" panose="020B0509030504030204" pitchFamily="49" charset="77"/>
                 <a:ea typeface="DejaVu Sans Book" panose="020B0603030804020204" pitchFamily="34" charset="0"/>
                 <a:cs typeface="DejaVu Sans Book" panose="020B0603030804020204" pitchFamily="34" charset="0"/>
@@ -6955,7 +6725,7 @@
           </a:p>
           <a:p>
             <a:r>
-              <a:rPr lang="en-GB" sz="1400" dirty="0" err="1">
+              <a:rPr lang="en-GB" dirty="0" err="1">
                 <a:latin typeface="Lucida Sans Typewriter" panose="020B0509030504030204" pitchFamily="49" charset="77"/>
                 <a:ea typeface="DejaVu Sans Book" panose="020B0603030804020204" pitchFamily="34" charset="0"/>
                 <a:cs typeface="DejaVu Sans Book" panose="020B0603030804020204" pitchFamily="34" charset="0"/>
@@ -6963,7 +6733,7 @@
               <a:t>printfn</a:t>
             </a:r>
             <a:r>
-              <a:rPr lang="en-GB" sz="1400" dirty="0">
+              <a:rPr lang="en-GB" dirty="0">
                 <a:latin typeface="Lucida Sans Typewriter" panose="020B0509030504030204" pitchFamily="49" charset="77"/>
                 <a:ea typeface="DejaVu Sans Book" panose="020B0603030804020204" pitchFamily="34" charset="0"/>
                 <a:cs typeface="DejaVu Sans Book" panose="020B0603030804020204" pitchFamily="34" charset="0"/>
@@ -6971,7 +6741,7 @@
               <a:t> "%d" (</a:t>
             </a:r>
             <a:r>
-              <a:rPr lang="en-GB" sz="1400" dirty="0" err="1">
+              <a:rPr lang="en-GB" dirty="0" err="1">
                 <a:latin typeface="Lucida Sans Typewriter" panose="020B0509030504030204" pitchFamily="49" charset="77"/>
                 <a:ea typeface="DejaVu Sans Book" panose="020B0603030804020204" pitchFamily="34" charset="0"/>
                 <a:cs typeface="DejaVu Sans Book" panose="020B0603030804020204" pitchFamily="34" charset="0"/>
@@ -6979,97 +6749,13 @@
               <a:t>incr</a:t>
             </a:r>
             <a:r>
-              <a:rPr lang="en-GB" sz="1400" dirty="0">
+              <a:rPr lang="en-GB" dirty="0">
                 <a:latin typeface="Lucida Sans Typewriter" panose="020B0509030504030204" pitchFamily="49" charset="77"/>
                 <a:ea typeface="DejaVu Sans Book" panose="020B0603030804020204" pitchFamily="34" charset="0"/>
                 <a:cs typeface="DejaVu Sans Book" panose="020B0603030804020204" pitchFamily="34" charset="0"/>
               </a:rPr>
               <a:t> ())</a:t>
             </a:r>
-          </a:p>
-        </p:txBody>
-      </p:sp>
-      <p:sp>
-        <p:nvSpPr>
-          <p:cNvPr id="3" name="TextBox 2">
-            <a:extLst>
-              <a:ext uri="{FF2B5EF4-FFF2-40B4-BE49-F238E27FC236}">
-                <a16:creationId xmlns:a16="http://schemas.microsoft.com/office/drawing/2014/main" id="{B38DD3FF-BDF5-5242-B77F-CC588477AE85}"/>
-              </a:ext>
-            </a:extLst>
-          </p:cNvPr>
-          <p:cNvSpPr txBox="1"/>
-          <p:nvPr/>
-        </p:nvSpPr>
-        <p:spPr>
-          <a:xfrm>
-            <a:off x="1026368" y="1633840"/>
-            <a:ext cx="2230034" cy="461665"/>
-          </a:xfrm>
-          <a:prstGeom prst="rect">
-            <a:avLst/>
-          </a:prstGeom>
-          <a:noFill/>
-        </p:spPr>
-        <p:txBody>
-          <a:bodyPr wrap="none" rtlCol="0">
-            <a:spAutoFit/>
-          </a:bodyPr>
-          <a:lstStyle/>
-          <a:p>
-            <a:r>
-              <a:rPr lang="da-DK" sz="2400" dirty="0" err="1"/>
-              <a:t>Closure</a:t>
-            </a:r>
-            <a:r>
-              <a:rPr lang="da-DK" sz="2400" dirty="0"/>
-              <a:t> i </a:t>
-            </a:r>
-            <a:r>
-              <a:rPr lang="da-DK" sz="2400" dirty="0" err="1"/>
-              <a:t>closure</a:t>
-            </a:r>
-            <a:endParaRPr lang="da-DK" sz="2400" dirty="0"/>
-          </a:p>
-        </p:txBody>
-      </p:sp>
-      <p:sp>
-        <p:nvSpPr>
-          <p:cNvPr id="6" name="TextBox 5">
-            <a:extLst>
-              <a:ext uri="{FF2B5EF4-FFF2-40B4-BE49-F238E27FC236}">
-                <a16:creationId xmlns:a16="http://schemas.microsoft.com/office/drawing/2014/main" id="{FE26F908-733F-644F-8AE7-EA8B0ED4B3FE}"/>
-              </a:ext>
-            </a:extLst>
-          </p:cNvPr>
-          <p:cNvSpPr txBox="1"/>
-          <p:nvPr/>
-        </p:nvSpPr>
-        <p:spPr>
-          <a:xfrm>
-            <a:off x="6329266" y="1690690"/>
-            <a:ext cx="2663934" cy="461665"/>
-          </a:xfrm>
-          <a:prstGeom prst="rect">
-            <a:avLst/>
-          </a:prstGeom>
-          <a:noFill/>
-        </p:spPr>
-        <p:txBody>
-          <a:bodyPr wrap="none" rtlCol="0">
-            <a:spAutoFit/>
-          </a:bodyPr>
-          <a:lstStyle/>
-          <a:p>
-            <a:r>
-              <a:rPr lang="da-DK" sz="2400" dirty="0"/>
-              <a:t>Den virkeligt </a:t>
-            </a:r>
-            <a:r>
-              <a:rPr lang="da-DK" sz="2400" dirty="0" err="1"/>
-              <a:t>sværre</a:t>
-            </a:r>
-            <a:endParaRPr lang="da-DK" sz="2400" dirty="0"/>
           </a:p>
         </p:txBody>
       </p:sp>
@@ -7087,8 +6773,8 @@
         </p:nvSpPr>
         <p:spPr>
           <a:xfrm>
-            <a:off x="6607629" y="4500637"/>
-            <a:ext cx="4151758" cy="954107"/>
+            <a:off x="3786856" y="4705646"/>
+            <a:ext cx="4151758" cy="1200329"/>
           </a:xfrm>
           <a:prstGeom prst="rect">
             <a:avLst/>
@@ -7101,7 +6787,7 @@
           <a:lstStyle/>
           <a:p>
             <a:r>
-              <a:rPr lang="en-GB" sz="1400" dirty="0">
+              <a:rPr lang="en-GB" dirty="0">
                 <a:latin typeface="Lucida Sans Typewriter" panose="020B0509030504030204" pitchFamily="49" charset="77"/>
                 <a:ea typeface="DejaVu Sans Book" panose="020B0603030804020204" pitchFamily="34" charset="0"/>
                 <a:cs typeface="DejaVu Sans Book" panose="020B0603030804020204" pitchFamily="34" charset="0"/>
@@ -7109,7 +6795,7 @@
               <a:t>$ </a:t>
             </a:r>
             <a:r>
-              <a:rPr lang="en-GB" sz="1400" dirty="0" err="1">
+              <a:rPr lang="en-GB" dirty="0" err="1">
                 <a:latin typeface="Lucida Sans Typewriter" panose="020B0509030504030204" pitchFamily="49" charset="77"/>
                 <a:ea typeface="DejaVu Sans Book" panose="020B0603030804020204" pitchFamily="34" charset="0"/>
                 <a:cs typeface="DejaVu Sans Book" panose="020B0603030804020204" pitchFamily="34" charset="0"/>
@@ -7117,7 +6803,7 @@
               <a:t>fsharpi</a:t>
             </a:r>
             <a:r>
-              <a:rPr lang="en-GB" sz="1400" dirty="0">
+              <a:rPr lang="en-GB" dirty="0">
                 <a:latin typeface="Lucida Sans Typewriter" panose="020B0509030504030204" pitchFamily="49" charset="77"/>
                 <a:ea typeface="DejaVu Sans Book" panose="020B0603030804020204" pitchFamily="34" charset="0"/>
                 <a:cs typeface="DejaVu Sans Book" panose="020B0603030804020204" pitchFamily="34" charset="0"/>
@@ -7125,14 +6811,14 @@
               <a:t> </a:t>
             </a:r>
             <a:r>
-              <a:rPr lang="en-GB" sz="1400" dirty="0" err="1">
+              <a:rPr lang="en-GB" dirty="0" err="1">
                 <a:latin typeface="Lucida Sans Typewriter" panose="020B0509030504030204" pitchFamily="49" charset="77"/>
                 <a:ea typeface="DejaVu Sans Book" panose="020B0603030804020204" pitchFamily="34" charset="0"/>
                 <a:cs typeface="DejaVu Sans Book" panose="020B0603030804020204" pitchFamily="34" charset="0"/>
               </a:rPr>
               <a:t>inc.fsx</a:t>
             </a:r>
-            <a:endParaRPr lang="en-GB" sz="1400" dirty="0">
+            <a:endParaRPr lang="en-GB" dirty="0">
               <a:latin typeface="Lucida Sans Typewriter" panose="020B0509030504030204" pitchFamily="49" charset="77"/>
               <a:ea typeface="DejaVu Sans Book" panose="020B0603030804020204" pitchFamily="34" charset="0"/>
               <a:cs typeface="DejaVu Sans Book" panose="020B0603030804020204" pitchFamily="34" charset="0"/>
@@ -7140,7 +6826,7 @@
           </a:p>
           <a:p>
             <a:r>
-              <a:rPr lang="en-GB" sz="1400" dirty="0">
+              <a:rPr lang="en-GB" dirty="0">
                 <a:latin typeface="Lucida Sans Typewriter" panose="020B0509030504030204" pitchFamily="49" charset="77"/>
                 <a:ea typeface="DejaVu Sans Book" panose="020B0603030804020204" pitchFamily="34" charset="0"/>
                 <a:cs typeface="DejaVu Sans Book" panose="020B0603030804020204" pitchFamily="34" charset="0"/>
@@ -7150,7 +6836,7 @@
           </a:p>
           <a:p>
             <a:r>
-              <a:rPr lang="en-GB" sz="1400" dirty="0">
+              <a:rPr lang="en-GB" dirty="0">
                 <a:latin typeface="Lucida Sans Typewriter" panose="020B0509030504030204" pitchFamily="49" charset="77"/>
                 <a:ea typeface="DejaVu Sans Book" panose="020B0603030804020204" pitchFamily="34" charset="0"/>
                 <a:cs typeface="DejaVu Sans Book" panose="020B0603030804020204" pitchFamily="34" charset="0"/>
@@ -7160,99 +6846,12 @@
           </a:p>
           <a:p>
             <a:r>
-              <a:rPr lang="en-GB" sz="1400" dirty="0">
+              <a:rPr lang="en-GB" dirty="0">
                 <a:latin typeface="Lucida Sans Typewriter" panose="020B0509030504030204" pitchFamily="49" charset="77"/>
                 <a:ea typeface="DejaVu Sans Book" panose="020B0603030804020204" pitchFamily="34" charset="0"/>
                 <a:cs typeface="DejaVu Sans Book" panose="020B0603030804020204" pitchFamily="34" charset="0"/>
               </a:rPr>
               <a:t>3</a:t>
-            </a:r>
-          </a:p>
-        </p:txBody>
-      </p:sp>
-      <p:sp>
-        <p:nvSpPr>
-          <p:cNvPr id="8" name="Rectangle 7">
-            <a:extLst>
-              <a:ext uri="{FF2B5EF4-FFF2-40B4-BE49-F238E27FC236}">
-                <a16:creationId xmlns:a16="http://schemas.microsoft.com/office/drawing/2014/main" id="{F23A7989-7FE9-D146-8625-66DEC809F147}"/>
-              </a:ext>
-            </a:extLst>
-          </p:cNvPr>
-          <p:cNvSpPr/>
-          <p:nvPr/>
-        </p:nvSpPr>
-        <p:spPr>
-          <a:xfrm>
-            <a:off x="1267406" y="4500636"/>
-            <a:ext cx="4151758" cy="738664"/>
-          </a:xfrm>
-          <a:prstGeom prst="rect">
-            <a:avLst/>
-          </a:prstGeom>
-        </p:spPr>
-        <p:txBody>
-          <a:bodyPr wrap="square">
-            <a:spAutoFit/>
-          </a:bodyPr>
-          <a:lstStyle/>
-          <a:p>
-            <a:r>
-              <a:rPr lang="en-GB" sz="1400" dirty="0">
-                <a:latin typeface="Lucida Sans Typewriter" panose="020B0509030504030204" pitchFamily="49" charset="77"/>
-                <a:ea typeface="DejaVu Sans Book" panose="020B0603030804020204" pitchFamily="34" charset="0"/>
-                <a:cs typeface="DejaVu Sans Book" panose="020B0603030804020204" pitchFamily="34" charset="0"/>
-              </a:rPr>
-              <a:t>$ </a:t>
-            </a:r>
-            <a:r>
-              <a:rPr lang="en-GB" sz="1400" dirty="0" err="1">
-                <a:latin typeface="Lucida Sans Typewriter" panose="020B0509030504030204" pitchFamily="49" charset="77"/>
-                <a:ea typeface="DejaVu Sans Book" panose="020B0603030804020204" pitchFamily="34" charset="0"/>
-                <a:cs typeface="DejaVu Sans Book" panose="020B0603030804020204" pitchFamily="34" charset="0"/>
-              </a:rPr>
-              <a:t>fsharpi</a:t>
-            </a:r>
-            <a:r>
-              <a:rPr lang="en-GB" sz="1400" dirty="0">
-                <a:latin typeface="Lucida Sans Typewriter" panose="020B0509030504030204" pitchFamily="49" charset="77"/>
-                <a:ea typeface="DejaVu Sans Book" panose="020B0603030804020204" pitchFamily="34" charset="0"/>
-                <a:cs typeface="DejaVu Sans Book" panose="020B0603030804020204" pitchFamily="34" charset="0"/>
-              </a:rPr>
-              <a:t> </a:t>
-            </a:r>
-            <a:r>
-              <a:rPr lang="en-GB" sz="1400" dirty="0" err="1">
-                <a:latin typeface="Lucida Sans Typewriter" panose="020B0509030504030204" pitchFamily="49" charset="77"/>
-                <a:ea typeface="DejaVu Sans Book" panose="020B0603030804020204" pitchFamily="34" charset="0"/>
-                <a:cs typeface="DejaVu Sans Book" panose="020B0603030804020204" pitchFamily="34" charset="0"/>
-              </a:rPr>
-              <a:t>functionFirstClass.fsx</a:t>
-            </a:r>
-            <a:endParaRPr lang="en-GB" sz="1400" dirty="0">
-              <a:latin typeface="Lucida Sans Typewriter" panose="020B0509030504030204" pitchFamily="49" charset="77"/>
-              <a:ea typeface="DejaVu Sans Book" panose="020B0603030804020204" pitchFamily="34" charset="0"/>
-              <a:cs typeface="DejaVu Sans Book" panose="020B0603030804020204" pitchFamily="34" charset="0"/>
-            </a:endParaRPr>
-          </a:p>
-          <a:p>
-            <a:r>
-              <a:rPr lang="en-GB" sz="1400" dirty="0">
-                <a:latin typeface="Lucida Sans Typewriter" panose="020B0509030504030204" pitchFamily="49" charset="77"/>
-                <a:ea typeface="DejaVu Sans Book" panose="020B0603030804020204" pitchFamily="34" charset="0"/>
-                <a:cs typeface="DejaVu Sans Book" panose="020B0603030804020204" pitchFamily="34" charset="0"/>
-              </a:rPr>
-              <a:t>15</a:t>
-            </a:r>
-          </a:p>
-          <a:p>
-            <a:r>
-              <a:rPr lang="en-GB" sz="1400" dirty="0">
-                <a:latin typeface="Lucida Sans Typewriter" panose="020B0509030504030204" pitchFamily="49" charset="77"/>
-                <a:ea typeface="DejaVu Sans Book" panose="020B0603030804020204" pitchFamily="34" charset="0"/>
-                <a:cs typeface="DejaVu Sans Book" panose="020B0603030804020204" pitchFamily="34" charset="0"/>
-              </a:rPr>
-              <a:t>6</a:t>
             </a:r>
           </a:p>
         </p:txBody>
@@ -7314,33 +6913,6 @@
                                   </p:childTnLst>
                                 </p:cTn>
                               </p:par>
-                              <p:par>
-                                <p:cTn id="7" presetID="1" presetClass="entr" presetSubtype="0" fill="hold" grpId="0" nodeType="withEffect">
-                                  <p:stCondLst>
-                                    <p:cond delay="0"/>
-                                  </p:stCondLst>
-                                  <p:childTnLst>
-                                    <p:set>
-                                      <p:cBhvr>
-                                        <p:cTn id="8" dur="1" fill="hold">
-                                          <p:stCondLst>
-                                            <p:cond delay="0"/>
-                                          </p:stCondLst>
-                                        </p:cTn>
-                                        <p:tgtEl>
-                                          <p:spTgt spid="6"/>
-                                        </p:tgtEl>
-                                        <p:attrNameLst>
-                                          <p:attrName>style.visibility</p:attrName>
-                                        </p:attrNameLst>
-                                      </p:cBhvr>
-                                      <p:to>
-                                        <p:strVal val="visible"/>
-                                      </p:to>
-                                    </p:set>
-                                  </p:childTnLst>
-                                </p:cTn>
-                              </p:par>
                             </p:childTnLst>
                           </p:cTn>
                         </p:par>
@@ -7348,77 +6920,32 @@
                     </p:cTn>
                   </p:par>
                   <p:par>
-                    <p:cTn id="9" fill="hold">
+                    <p:cTn id="7" fill="hold">
                       <p:stCondLst>
                         <p:cond delay="indefinite"/>
                       </p:stCondLst>
                       <p:childTnLst>
                         <p:par>
-                          <p:cTn id="10" fill="hold">
+                          <p:cTn id="8" fill="hold">
                             <p:stCondLst>
                               <p:cond delay="0"/>
                             </p:stCondLst>
                             <p:childTnLst>
                               <p:par>
-                                <p:cTn id="11" presetID="1" presetClass="entr" presetSubtype="0" fill="hold" grpId="0" nodeType="clickEffect">
+                                <p:cTn id="9" presetID="1" presetClass="entr" presetSubtype="0" fill="hold" grpId="0" nodeType="clickEffect">
                                   <p:stCondLst>
                                     <p:cond delay="0"/>
                                   </p:stCondLst>
                                   <p:childTnLst>
                                     <p:set>
                                       <p:cBhvr>
-                                        <p:cTn id="12" dur="1" fill="hold">
+                                        <p:cTn id="10" dur="1" fill="hold">
                                           <p:stCondLst>
                                             <p:cond delay="0"/>
                                           </p:stCondLst>
                                         </p:cTn>
                                         <p:tgtEl>
                                           <p:spTgt spid="7"/>
-                                        </p:tgtEl>
-                                        <p:attrNameLst>
-                                          <p:attrName>style.visibility</p:attrName>
-                                        </p:attrNameLst>
-                                      </p:cBhvr>
-                                      <p:to>
-                                        <p:strVal val="visible"/>
-                                      </p:to>
-                                    </p:set>
-                                  </p:childTnLst>
-                                </p:cTn>
-                              </p:par>
-                            </p:childTnLst>
-                          </p:cTn>
-                        </p:par>
-                      </p:childTnLst>
-                    </p:cTn>
-                  </p:par>
-                  <p:par>
-                    <p:cTn id="13" fill="hold">
-                      <p:stCondLst>
-                        <p:cond delay="indefinite"/>
-                      </p:stCondLst>
-                      <p:childTnLst>
-                        <p:par>
-                          <p:cTn id="14" fill="hold">
-                            <p:stCondLst>
-                              <p:cond delay="0"/>
-                            </p:stCondLst>
-                            <p:childTnLst>
-                              <p:par>
-                                <p:cTn id="15" presetID="1" presetClass="entr" presetSubtype="0" fill="hold" grpId="0" nodeType="clickEffect">
-                                  <p:stCondLst>
-                                    <p:cond delay="0"/>
-                                  </p:stCondLst>
-                                  <p:childTnLst>
-                                    <p:set>
-                                      <p:cBhvr>
-                                        <p:cTn id="16" dur="1" fill="hold">
-                                          <p:stCondLst>
-                                            <p:cond delay="0"/>
-                                          </p:stCondLst>
-                                        </p:cTn>
-                                        <p:tgtEl>
-                                          <p:spTgt spid="8"/>
                                         </p:tgtEl>
                                         <p:attrNameLst>
                                           <p:attrName>style.visibility</p:attrName>
@@ -7460,9 +6987,7 @@
     </p:tnLst>
     <p:bldLst>
       <p:bldP spid="5" grpId="0"/>
-      <p:bldP spid="6" grpId="0"/>
       <p:bldP spid="7" grpId="0"/>
-      <p:bldP spid="8" grpId="0"/>
     </p:bldLst>
   </p:timing>
 </p:sld>

</xml_diff>